<commit_message>
misc page, icon updates (#15)
Signed-off-by: Dave Skender <8432125+DaveSkender@users.noreply.github.com>
</commit_message>
<xml_diff>
--- a/.offline/sphere.pptx
+++ b/.offline/sphere.pptx
@@ -313,7 +313,7 @@
           <a:p>
             <a:fld id="{54A559BA-E8BD-4DC5-BF7B-9C9B47EAD6B8}" type="datetimeFigureOut">
               <a:rPr lang="en-US" smtClean="0"/>
-              <a:t>5/13/2023</a:t>
+              <a:t>7/22/2023</a:t>
             </a:fld>
             <a:endParaRPr lang="en-US"/>
           </a:p>
@@ -511,7 +511,7 @@
           <a:p>
             <a:fld id="{54A559BA-E8BD-4DC5-BF7B-9C9B47EAD6B8}" type="datetimeFigureOut">
               <a:rPr lang="en-US" smtClean="0"/>
-              <a:t>5/13/2023</a:t>
+              <a:t>7/22/2023</a:t>
             </a:fld>
             <a:endParaRPr lang="en-US"/>
           </a:p>
@@ -719,7 +719,7 @@
           <a:p>
             <a:fld id="{54A559BA-E8BD-4DC5-BF7B-9C9B47EAD6B8}" type="datetimeFigureOut">
               <a:rPr lang="en-US" smtClean="0"/>
-              <a:t>5/13/2023</a:t>
+              <a:t>7/22/2023</a:t>
             </a:fld>
             <a:endParaRPr lang="en-US"/>
           </a:p>
@@ -917,7 +917,7 @@
           <a:p>
             <a:fld id="{54A559BA-E8BD-4DC5-BF7B-9C9B47EAD6B8}" type="datetimeFigureOut">
               <a:rPr lang="en-US" smtClean="0"/>
-              <a:t>5/13/2023</a:t>
+              <a:t>7/22/2023</a:t>
             </a:fld>
             <a:endParaRPr lang="en-US"/>
           </a:p>
@@ -1192,7 +1192,7 @@
           <a:p>
             <a:fld id="{54A559BA-E8BD-4DC5-BF7B-9C9B47EAD6B8}" type="datetimeFigureOut">
               <a:rPr lang="en-US" smtClean="0"/>
-              <a:t>5/13/2023</a:t>
+              <a:t>7/22/2023</a:t>
             </a:fld>
             <a:endParaRPr lang="en-US"/>
           </a:p>
@@ -1457,7 +1457,7 @@
           <a:p>
             <a:fld id="{54A559BA-E8BD-4DC5-BF7B-9C9B47EAD6B8}" type="datetimeFigureOut">
               <a:rPr lang="en-US" smtClean="0"/>
-              <a:t>5/13/2023</a:t>
+              <a:t>7/22/2023</a:t>
             </a:fld>
             <a:endParaRPr lang="en-US"/>
           </a:p>
@@ -1869,7 +1869,7 @@
           <a:p>
             <a:fld id="{54A559BA-E8BD-4DC5-BF7B-9C9B47EAD6B8}" type="datetimeFigureOut">
               <a:rPr lang="en-US" smtClean="0"/>
-              <a:t>5/13/2023</a:t>
+              <a:t>7/22/2023</a:t>
             </a:fld>
             <a:endParaRPr lang="en-US"/>
           </a:p>
@@ -2010,7 +2010,7 @@
           <a:p>
             <a:fld id="{54A559BA-E8BD-4DC5-BF7B-9C9B47EAD6B8}" type="datetimeFigureOut">
               <a:rPr lang="en-US" smtClean="0"/>
-              <a:t>5/13/2023</a:t>
+              <a:t>7/22/2023</a:t>
             </a:fld>
             <a:endParaRPr lang="en-US"/>
           </a:p>
@@ -2123,7 +2123,7 @@
           <a:p>
             <a:fld id="{54A559BA-E8BD-4DC5-BF7B-9C9B47EAD6B8}" type="datetimeFigureOut">
               <a:rPr lang="en-US" smtClean="0"/>
-              <a:t>5/13/2023</a:t>
+              <a:t>7/22/2023</a:t>
             </a:fld>
             <a:endParaRPr lang="en-US"/>
           </a:p>
@@ -2434,7 +2434,7 @@
           <a:p>
             <a:fld id="{54A559BA-E8BD-4DC5-BF7B-9C9B47EAD6B8}" type="datetimeFigureOut">
               <a:rPr lang="en-US" smtClean="0"/>
-              <a:t>5/13/2023</a:t>
+              <a:t>7/22/2023</a:t>
             </a:fld>
             <a:endParaRPr lang="en-US"/>
           </a:p>
@@ -2722,7 +2722,7 @@
           <a:p>
             <a:fld id="{54A559BA-E8BD-4DC5-BF7B-9C9B47EAD6B8}" type="datetimeFigureOut">
               <a:rPr lang="en-US" smtClean="0"/>
-              <a:t>5/13/2023</a:t>
+              <a:t>7/22/2023</a:t>
             </a:fld>
             <a:endParaRPr lang="en-US"/>
           </a:p>
@@ -2963,7 +2963,7 @@
           <a:p>
             <a:fld id="{54A559BA-E8BD-4DC5-BF7B-9C9B47EAD6B8}" type="datetimeFigureOut">
               <a:rPr lang="en-US" smtClean="0"/>
-              <a:t>5/13/2023</a:t>
+              <a:t>7/22/2023</a:t>
             </a:fld>
             <a:endParaRPr lang="en-US"/>
           </a:p>
@@ -3552,6 +3552,72 @@
           </a:prstGeom>
         </p:spPr>
       </p:pic>
+      <p:sp>
+        <p:nvSpPr>
+          <p:cNvPr id="2" name="Oval 1">
+            <a:extLst>
+              <a:ext uri="{FF2B5EF4-FFF2-40B4-BE49-F238E27FC236}">
+                <a16:creationId xmlns:a16="http://schemas.microsoft.com/office/drawing/2014/main" id="{6BF94FC5-8717-9473-9218-4E2CF3FBDF8E}"/>
+              </a:ext>
+            </a:extLst>
+          </p:cNvPr>
+          <p:cNvSpPr>
+            <a:spLocks noChangeAspect="1"/>
+          </p:cNvSpPr>
+          <p:nvPr/>
+        </p:nvSpPr>
+        <p:spPr>
+          <a:xfrm>
+            <a:off x="722150" y="2705510"/>
+            <a:ext cx="3200400" cy="3200400"/>
+          </a:xfrm>
+          <a:prstGeom prst="ellipse">
+            <a:avLst/>
+          </a:prstGeom>
+          <a:solidFill>
+            <a:schemeClr val="tx1"/>
+          </a:solidFill>
+          <a:ln>
+            <a:noFill/>
+          </a:ln>
+          <a:effectLst/>
+          <a:scene3d>
+            <a:camera prst="orthographicFront"/>
+            <a:lightRig rig="glow" dir="t"/>
+          </a:scene3d>
+          <a:sp3d prstMaterial="plastic">
+            <a:bevelT w="1645920" h="1645920"/>
+            <a:bevelB w="1645920" h="1645920"/>
+            <a:contourClr>
+              <a:srgbClr val="181818"/>
+            </a:contourClr>
+          </a:sp3d>
+        </p:spPr>
+        <p:style>
+          <a:lnRef idx="2">
+            <a:schemeClr val="accent1">
+              <a:shade val="50000"/>
+            </a:schemeClr>
+          </a:lnRef>
+          <a:fillRef idx="1">
+            <a:schemeClr val="accent1"/>
+          </a:fillRef>
+          <a:effectRef idx="0">
+            <a:schemeClr val="accent1"/>
+          </a:effectRef>
+          <a:fontRef idx="minor">
+            <a:schemeClr val="lt1"/>
+          </a:fontRef>
+        </p:style>
+        <p:txBody>
+          <a:bodyPr rtlCol="0" anchor="ctr"/>
+          <a:lstStyle/>
+          <a:p>
+            <a:pPr algn="ctr"/>
+            <a:endParaRPr lang="en-US"/>
+          </a:p>
+        </p:txBody>
+      </p:sp>
     </p:spTree>
     <p:extLst>
       <p:ext uri="{BB962C8B-B14F-4D97-AF65-F5344CB8AC3E}">

</xml_diff>